<commit_message>
Add slides on documentation
</commit_message>
<xml_diff>
--- a/Debugging/debugging_coding_style.pptx
+++ b/Debugging/debugging_coding_style.pptx
@@ -5,7 +5,7 @@
     <p:sldMasterId id="2147483648" r:id="rId1"/>
   </p:sldMasterIdLst>
   <p:notesMasterIdLst>
-    <p:notesMasterId r:id="rId15"/>
+    <p:notesMasterId r:id="rId17"/>
   </p:notesMasterIdLst>
   <p:sldIdLst>
     <p:sldId id="325" r:id="rId2"/>
@@ -18,9 +18,11 @@
     <p:sldId id="337" r:id="rId9"/>
     <p:sldId id="331" r:id="rId10"/>
     <p:sldId id="332" r:id="rId11"/>
-    <p:sldId id="333" r:id="rId12"/>
-    <p:sldId id="334" r:id="rId13"/>
-    <p:sldId id="335" r:id="rId14"/>
+    <p:sldId id="338" r:id="rId12"/>
+    <p:sldId id="339" r:id="rId13"/>
+    <p:sldId id="340" r:id="rId14"/>
+    <p:sldId id="333" r:id="rId15"/>
+    <p:sldId id="334" r:id="rId16"/>
   </p:sldIdLst>
   <p:sldSz cx="9144000" cy="6858000" type="screen4x3"/>
   <p:notesSz cx="6858000" cy="9144000"/>
@@ -134,9 +136,11 @@
             <p14:sldId id="337"/>
             <p14:sldId id="331"/>
             <p14:sldId id="332"/>
+            <p14:sldId id="338"/>
+            <p14:sldId id="339"/>
+            <p14:sldId id="340"/>
             <p14:sldId id="333"/>
             <p14:sldId id="334"/>
-            <p14:sldId id="335"/>
           </p14:sldIdLst>
         </p14:section>
       </p14:sectionLst>
@@ -241,7 +245,7 @@
           <a:p>
             <a:fld id="{502C2D9C-5F44-4BEA-A487-7844C0A6EA6F}" type="datetimeFigureOut">
               <a:rPr lang="en-US" smtClean="0"/>
-              <a:t>2017-08-30</a:t>
+              <a:t>2017-08-31</a:t>
             </a:fld>
             <a:endParaRPr lang="en-US"/>
           </a:p>
@@ -945,7 +949,7 @@
           <a:p>
             <a:fld id="{F040793B-6B2D-4C15-AA3B-2B590D678484}" type="datetime1">
               <a:rPr lang="nl-BE" smtClean="0"/>
-              <a:t>30/08/2017</a:t>
+              <a:t>31/08/2017</a:t>
             </a:fld>
             <a:endParaRPr lang="nl-BE"/>
           </a:p>
@@ -1115,7 +1119,7 @@
           <a:p>
             <a:fld id="{2D37E66E-B716-4606-B8B1-9B6252DA1C31}" type="datetime1">
               <a:rPr lang="nl-BE" smtClean="0"/>
-              <a:t>30/08/2017</a:t>
+              <a:t>31/08/2017</a:t>
             </a:fld>
             <a:endParaRPr lang="nl-BE"/>
           </a:p>
@@ -1295,7 +1299,7 @@
           <a:p>
             <a:fld id="{D27BE024-1EC1-4CF3-892F-E5AEDBBDAF43}" type="datetime1">
               <a:rPr lang="nl-BE" smtClean="0"/>
-              <a:t>30/08/2017</a:t>
+              <a:t>31/08/2017</a:t>
             </a:fld>
             <a:endParaRPr lang="nl-BE"/>
           </a:p>
@@ -1465,7 +1469,7 @@
           <a:p>
             <a:fld id="{CCA5A459-17E9-40CB-8DFF-3495D9532F5F}" type="datetime1">
               <a:rPr lang="nl-BE" smtClean="0"/>
-              <a:t>30/08/2017</a:t>
+              <a:t>31/08/2017</a:t>
             </a:fld>
             <a:endParaRPr lang="nl-BE"/>
           </a:p>
@@ -1711,7 +1715,7 @@
           <a:p>
             <a:fld id="{5A4E9FFD-C954-4452-B7AA-4258EE843141}" type="datetime1">
               <a:rPr lang="nl-BE" smtClean="0"/>
-              <a:t>30/08/2017</a:t>
+              <a:t>31/08/2017</a:t>
             </a:fld>
             <a:endParaRPr lang="nl-BE"/>
           </a:p>
@@ -1999,7 +2003,7 @@
           <a:p>
             <a:fld id="{C4893177-87BD-40F9-B185-7AFB7D4CEF73}" type="datetime1">
               <a:rPr lang="nl-BE" smtClean="0"/>
-              <a:t>30/08/2017</a:t>
+              <a:t>31/08/2017</a:t>
             </a:fld>
             <a:endParaRPr lang="nl-BE"/>
           </a:p>
@@ -2421,7 +2425,7 @@
           <a:p>
             <a:fld id="{BA148501-D7B5-4BCB-9078-D703F110142A}" type="datetime1">
               <a:rPr lang="nl-BE" smtClean="0"/>
-              <a:t>30/08/2017</a:t>
+              <a:t>31/08/2017</a:t>
             </a:fld>
             <a:endParaRPr lang="nl-BE"/>
           </a:p>
@@ -2539,7 +2543,7 @@
           <a:p>
             <a:fld id="{717356EE-368E-44B1-99B8-D1873F9EF3C7}" type="datetime1">
               <a:rPr lang="nl-BE" smtClean="0"/>
-              <a:t>30/08/2017</a:t>
+              <a:t>31/08/2017</a:t>
             </a:fld>
             <a:endParaRPr lang="nl-BE"/>
           </a:p>
@@ -2634,7 +2638,7 @@
           <a:p>
             <a:fld id="{5F2629CF-4829-4382-B971-3BE68878549E}" type="datetime1">
               <a:rPr lang="nl-BE" smtClean="0"/>
-              <a:t>30/08/2017</a:t>
+              <a:t>31/08/2017</a:t>
             </a:fld>
             <a:endParaRPr lang="nl-BE"/>
           </a:p>
@@ -2911,7 +2915,7 @@
           <a:p>
             <a:fld id="{2E37DD13-C48A-4BFB-8D81-B2AA98934241}" type="datetime1">
               <a:rPr lang="nl-BE" smtClean="0"/>
-              <a:t>30/08/2017</a:t>
+              <a:t>31/08/2017</a:t>
             </a:fld>
             <a:endParaRPr lang="nl-BE"/>
           </a:p>
@@ -3164,7 +3168,7 @@
           <a:p>
             <a:fld id="{9B6CF485-62E7-4248-8840-CBD8B411E02C}" type="datetime1">
               <a:rPr lang="nl-BE" smtClean="0"/>
-              <a:t>30/08/2017</a:t>
+              <a:t>31/08/2017</a:t>
             </a:fld>
             <a:endParaRPr lang="nl-BE"/>
           </a:p>
@@ -3377,7 +3381,7 @@
           <a:p>
             <a:fld id="{07FE4AAB-B594-45D1-940E-556EEBDDCDA0}" type="datetime1">
               <a:rPr lang="nl-BE" smtClean="0"/>
-              <a:t>30/08/2017</a:t>
+              <a:t>31/08/2017</a:t>
             </a:fld>
             <a:endParaRPr lang="nl-BE"/>
           </a:p>
@@ -3891,7 +3895,7 @@
         <p:spPr/>
         <p:txBody>
           <a:bodyPr>
-            <a:normAutofit fontScale="85000" lnSpcReduction="20000"/>
+            <a:normAutofit fontScale="92500" lnSpcReduction="20000"/>
           </a:bodyPr>
           <a:lstStyle/>
           <a:p>
@@ -3940,50 +3944,65 @@
             <a:pPr lvl="1"/>
             <a:r>
               <a:rPr lang="en-US" dirty="0" smtClean="0"/>
-              <a:t>functions/methods: semantics, arguments, return type, exceptions</a:t>
-            </a:r>
+              <a:t>functions/methods</a:t>
+            </a:r>
+            <a:endParaRPr lang="en-US" dirty="0" smtClean="0"/>
           </a:p>
           <a:p>
             <a:pPr lvl="1"/>
             <a:r>
               <a:rPr lang="en-US" dirty="0" smtClean="0"/>
-              <a:t>classes: semantics, high level functionality</a:t>
-            </a:r>
+              <a:t>classes</a:t>
+            </a:r>
+            <a:endParaRPr lang="en-US" dirty="0" smtClean="0"/>
           </a:p>
           <a:p>
             <a:pPr lvl="1"/>
             <a:r>
               <a:rPr lang="en-US" dirty="0" smtClean="0"/>
-              <a:t>constants: semantics</a:t>
-            </a:r>
-          </a:p>
-          <a:p>
+              <a:t>constants: </a:t>
+            </a:r>
             <a:r>
               <a:rPr lang="en-US" dirty="0" smtClean="0"/>
-              <a:t>Python</a:t>
-            </a:r>
-          </a:p>
-          <a:p>
-            <a:pPr lvl="1"/>
+              <a:t>semantics, units</a:t>
+            </a:r>
+            <a:endParaRPr lang="en-US" dirty="0" smtClean="0"/>
+          </a:p>
+          <a:p>
+            <a:r>
+              <a:rPr lang="en-US" dirty="0" err="1" smtClean="0"/>
+              <a:t>doxygen</a:t>
+            </a:r>
+            <a:r>
+              <a:rPr lang="en-US" dirty="0"/>
+              <a:t> (</a:t>
+            </a:r>
+            <a:r>
+              <a:rPr lang="en-US" dirty="0">
+                <a:hlinkClick r:id="rId2"/>
+              </a:rPr>
+              <a:t>http://www.stack.nl/~dimitri/doxygen</a:t>
+            </a:r>
+            <a:r>
+              <a:rPr lang="en-US" dirty="0" smtClean="0">
+                <a:hlinkClick r:id="rId2"/>
+              </a:rPr>
+              <a:t>/</a:t>
+            </a:r>
+            <a:r>
+              <a:rPr lang="en-US" dirty="0" smtClean="0"/>
+              <a:t>)</a:t>
+            </a:r>
+            <a:endParaRPr lang="en-US" dirty="0" smtClean="0"/>
+          </a:p>
+          <a:p>
+            <a:r>
+              <a:rPr lang="en-US" dirty="0" smtClean="0"/>
+              <a:t>For Python in addition: </a:t>
+            </a:r>
             <a:r>
               <a:rPr lang="en-US" dirty="0" err="1" smtClean="0"/>
               <a:t>docstring</a:t>
-            </a:r>
-            <a:endParaRPr lang="en-US" dirty="0" smtClean="0"/>
-          </a:p>
-          <a:p>
-            <a:pPr lvl="1"/>
-            <a:r>
-              <a:rPr lang="en-US" dirty="0" err="1" smtClean="0"/>
-              <a:t>doxygen</a:t>
-            </a:r>
-            <a:r>
-              <a:rPr lang="en-US" dirty="0" smtClean="0"/>
-              <a:t> </a:t>
-            </a:r>
-            <a:r>
-              <a:rPr lang="en-US" dirty="0" smtClean="0"/>
-              <a:t>(for many languages)</a:t>
             </a:r>
             <a:endParaRPr lang="en-US" dirty="0"/>
           </a:p>
@@ -4009,6 +4028,84 @@
               <a:t>10</a:t>
             </a:fld>
             <a:endParaRPr lang="en-US"/>
+          </a:p>
+        </p:txBody>
+      </p:sp>
+      <p:sp>
+        <p:nvSpPr>
+          <p:cNvPr id="5" name="TextBox 4"/>
+          <p:cNvSpPr txBox="1"/>
+          <p:nvPr/>
+        </p:nvSpPr>
+        <p:spPr>
+          <a:xfrm>
+            <a:off x="1728531" y="6010424"/>
+            <a:ext cx="5880777" cy="461665"/>
+          </a:xfrm>
+          <a:prstGeom prst="rect">
+            <a:avLst/>
+          </a:prstGeom>
+          <a:noFill/>
+          <a:ln>
+            <a:solidFill>
+              <a:srgbClr val="C00000"/>
+            </a:solidFill>
+          </a:ln>
+        </p:spPr>
+        <p:txBody>
+          <a:bodyPr wrap="none" rtlCol="0">
+            <a:spAutoFit/>
+          </a:bodyPr>
+          <a:lstStyle/>
+          <a:p>
+            <a:r>
+              <a:rPr lang="en-US" sz="2400" dirty="0" smtClean="0">
+                <a:solidFill>
+                  <a:srgbClr val="C00000"/>
+                </a:solidFill>
+              </a:rPr>
+              <a:t>Keep comments/documentation up to date!!!</a:t>
+            </a:r>
+            <a:endParaRPr lang="en-US" sz="2400" dirty="0">
+              <a:solidFill>
+                <a:srgbClr val="C00000"/>
+              </a:solidFill>
+            </a:endParaRPr>
+          </a:p>
+        </p:txBody>
+      </p:sp>
+      <p:sp>
+        <p:nvSpPr>
+          <p:cNvPr id="6" name="TextBox 5"/>
+          <p:cNvSpPr txBox="1"/>
+          <p:nvPr/>
+        </p:nvSpPr>
+        <p:spPr>
+          <a:xfrm>
+            <a:off x="6084168" y="1647825"/>
+            <a:ext cx="2696444" cy="369332"/>
+          </a:xfrm>
+          <a:prstGeom prst="rect">
+            <a:avLst/>
+          </a:prstGeom>
+          <a:noFill/>
+          <a:ln>
+            <a:solidFill>
+              <a:schemeClr val="tx1"/>
+            </a:solidFill>
+          </a:ln>
+        </p:spPr>
+        <p:txBody>
+          <a:bodyPr wrap="none" rtlCol="0">
+            <a:spAutoFit/>
+          </a:bodyPr>
+          <a:lstStyle/>
+          <a:p>
+            <a:r>
+              <a:rPr lang="en-US" dirty="0" smtClean="0"/>
+              <a:t>However, write clear code!</a:t>
+            </a:r>
+            <a:endParaRPr lang="en-US" dirty="0"/>
           </a:p>
         </p:txBody>
       </p:sp>
@@ -4139,11 +4236,7 @@
                                           </p:stCondLst>
                                         </p:cTn>
                                         <p:tgtEl>
-                                          <p:spTgt spid="3">
-                                            <p:txEl>
-                                              <p:pRg st="2" end="2"/>
-                                            </p:txEl>
-                                          </p:spTgt>
+                                          <p:spTgt spid="6"/>
                                         </p:tgtEl>
                                         <p:attrNameLst>
                                           <p:attrName>style.visibility</p:attrName>
@@ -4190,7 +4283,7 @@
                                         <p:tgtEl>
                                           <p:spTgt spid="3">
                                             <p:txEl>
-                                              <p:pRg st="3" end="3"/>
+                                              <p:pRg st="2" end="2"/>
                                             </p:txEl>
                                           </p:spTgt>
                                         </p:tgtEl>
@@ -4205,39 +4298,26 @@
                                   </p:childTnLst>
                                 </p:cTn>
                               </p:par>
+                            </p:childTnLst>
+                          </p:cTn>
+                        </p:par>
+                      </p:childTnLst>
+                    </p:cTn>
+                  </p:par>
+                  <p:par>
+                    <p:cTn id="17" fill="hold">
+                      <p:stCondLst>
+                        <p:cond delay="indefinite"/>
+                      </p:stCondLst>
+                      <p:childTnLst>
+                        <p:par>
+                          <p:cTn id="18" fill="hold">
+                            <p:stCondLst>
+                              <p:cond delay="0"/>
+                            </p:stCondLst>
+                            <p:childTnLst>
                               <p:par>
-                                <p:cTn id="17" presetID="1" presetClass="entr" presetSubtype="0" fill="hold" grpId="0" nodeType="withEffect">
-                                  <p:stCondLst>
-                                    <p:cond delay="0"/>
-                                  </p:stCondLst>
-                                  <p:childTnLst>
-                                    <p:set>
-                                      <p:cBhvr>
-                                        <p:cTn id="18" dur="1" fill="hold">
-                                          <p:stCondLst>
-                                            <p:cond delay="0"/>
-                                          </p:stCondLst>
-                                        </p:cTn>
-                                        <p:tgtEl>
-                                          <p:spTgt spid="3">
-                                            <p:txEl>
-                                              <p:pRg st="4" end="4"/>
-                                            </p:txEl>
-                                          </p:spTgt>
-                                        </p:tgtEl>
-                                        <p:attrNameLst>
-                                          <p:attrName>style.visibility</p:attrName>
-                                        </p:attrNameLst>
-                                      </p:cBhvr>
-                                      <p:to>
-                                        <p:strVal val="visible"/>
-                                      </p:to>
-                                    </p:set>
-                                  </p:childTnLst>
-                                </p:cTn>
-                              </p:par>
-                              <p:par>
-                                <p:cTn id="19" presetID="1" presetClass="entr" presetSubtype="0" fill="hold" grpId="0" nodeType="withEffect">
+                                <p:cTn id="19" presetID="1" presetClass="entr" presetSubtype="0" fill="hold" grpId="0" nodeType="clickEffect">
                                   <p:stCondLst>
                                     <p:cond delay="0"/>
                                   </p:stCondLst>
@@ -4252,7 +4332,7 @@
                                         <p:tgtEl>
                                           <p:spTgt spid="3">
                                             <p:txEl>
-                                              <p:pRg st="5" end="5"/>
+                                              <p:pRg st="3" end="3"/>
                                             </p:txEl>
                                           </p:spTgt>
                                         </p:tgtEl>
@@ -4283,7 +4363,7 @@
                                         <p:tgtEl>
                                           <p:spTgt spid="3">
                                             <p:txEl>
-                                              <p:pRg st="6" end="6"/>
+                                              <p:pRg st="4" end="4"/>
                                             </p:txEl>
                                           </p:spTgt>
                                         </p:tgtEl>
@@ -4314,6 +4394,68 @@
                                         <p:tgtEl>
                                           <p:spTgt spid="3">
                                             <p:txEl>
+                                              <p:pRg st="5" end="5"/>
+                                            </p:txEl>
+                                          </p:spTgt>
+                                        </p:tgtEl>
+                                        <p:attrNameLst>
+                                          <p:attrName>style.visibility</p:attrName>
+                                        </p:attrNameLst>
+                                      </p:cBhvr>
+                                      <p:to>
+                                        <p:strVal val="visible"/>
+                                      </p:to>
+                                    </p:set>
+                                  </p:childTnLst>
+                                </p:cTn>
+                              </p:par>
+                              <p:par>
+                                <p:cTn id="25" presetID="1" presetClass="entr" presetSubtype="0" fill="hold" grpId="0" nodeType="withEffect">
+                                  <p:stCondLst>
+                                    <p:cond delay="0"/>
+                                  </p:stCondLst>
+                                  <p:childTnLst>
+                                    <p:set>
+                                      <p:cBhvr>
+                                        <p:cTn id="26" dur="1" fill="hold">
+                                          <p:stCondLst>
+                                            <p:cond delay="0"/>
+                                          </p:stCondLst>
+                                        </p:cTn>
+                                        <p:tgtEl>
+                                          <p:spTgt spid="3">
+                                            <p:txEl>
+                                              <p:pRg st="6" end="6"/>
+                                            </p:txEl>
+                                          </p:spTgt>
+                                        </p:tgtEl>
+                                        <p:attrNameLst>
+                                          <p:attrName>style.visibility</p:attrName>
+                                        </p:attrNameLst>
+                                      </p:cBhvr>
+                                      <p:to>
+                                        <p:strVal val="visible"/>
+                                      </p:to>
+                                    </p:set>
+                                  </p:childTnLst>
+                                </p:cTn>
+                              </p:par>
+                              <p:par>
+                                <p:cTn id="27" presetID="1" presetClass="entr" presetSubtype="0" fill="hold" grpId="0" nodeType="withEffect">
+                                  <p:stCondLst>
+                                    <p:cond delay="0"/>
+                                  </p:stCondLst>
+                                  <p:childTnLst>
+                                    <p:set>
+                                      <p:cBhvr>
+                                        <p:cTn id="28" dur="1" fill="hold">
+                                          <p:stCondLst>
+                                            <p:cond delay="0"/>
+                                          </p:stCondLst>
+                                        </p:cTn>
+                                        <p:tgtEl>
+                                          <p:spTgt spid="3">
+                                            <p:txEl>
                                               <p:pRg st="7" end="7"/>
                                             </p:txEl>
                                           </p:spTgt>
@@ -4336,26 +4478,26 @@
                     </p:cTn>
                   </p:par>
                   <p:par>
-                    <p:cTn id="25" fill="hold">
+                    <p:cTn id="29" fill="hold">
                       <p:stCondLst>
                         <p:cond delay="indefinite"/>
                       </p:stCondLst>
                       <p:childTnLst>
                         <p:par>
-                          <p:cTn id="26" fill="hold">
+                          <p:cTn id="30" fill="hold">
                             <p:stCondLst>
                               <p:cond delay="0"/>
                             </p:stCondLst>
                             <p:childTnLst>
                               <p:par>
-                                <p:cTn id="27" presetID="1" presetClass="entr" presetSubtype="0" fill="hold" grpId="0" nodeType="clickEffect">
+                                <p:cTn id="31" presetID="1" presetClass="entr" presetSubtype="0" fill="hold" grpId="0" nodeType="clickEffect">
                                   <p:stCondLst>
                                     <p:cond delay="0"/>
                                   </p:stCondLst>
                                   <p:childTnLst>
                                     <p:set>
                                       <p:cBhvr>
-                                        <p:cTn id="28" dur="1" fill="hold">
+                                        <p:cTn id="32" dur="1" fill="hold">
                                           <p:stCondLst>
                                             <p:cond delay="0"/>
                                           </p:stCondLst>
@@ -4378,15 +4520,33 @@
                                   </p:childTnLst>
                                 </p:cTn>
                               </p:par>
+                            </p:childTnLst>
+                          </p:cTn>
+                        </p:par>
+                      </p:childTnLst>
+                    </p:cTn>
+                  </p:par>
+                  <p:par>
+                    <p:cTn id="33" fill="hold">
+                      <p:stCondLst>
+                        <p:cond delay="indefinite"/>
+                      </p:stCondLst>
+                      <p:childTnLst>
+                        <p:par>
+                          <p:cTn id="34" fill="hold">
+                            <p:stCondLst>
+                              <p:cond delay="0"/>
+                            </p:stCondLst>
+                            <p:childTnLst>
                               <p:par>
-                                <p:cTn id="29" presetID="1" presetClass="entr" presetSubtype="0" fill="hold" grpId="0" nodeType="withEffect">
+                                <p:cTn id="35" presetID="1" presetClass="entr" presetSubtype="0" fill="hold" grpId="0" nodeType="clickEffect">
                                   <p:stCondLst>
                                     <p:cond delay="0"/>
                                   </p:stCondLst>
                                   <p:childTnLst>
                                     <p:set>
                                       <p:cBhvr>
-                                        <p:cTn id="30" dur="1" fill="hold">
+                                        <p:cTn id="36" dur="1" fill="hold">
                                           <p:stCondLst>
                                             <p:cond delay="0"/>
                                           </p:stCondLst>
@@ -4409,25 +4569,39 @@
                                   </p:childTnLst>
                                 </p:cTn>
                               </p:par>
+                            </p:childTnLst>
+                          </p:cTn>
+                        </p:par>
+                      </p:childTnLst>
+                    </p:cTn>
+                  </p:par>
+                  <p:par>
+                    <p:cTn id="37" fill="hold">
+                      <p:stCondLst>
+                        <p:cond delay="indefinite"/>
+                      </p:stCondLst>
+                      <p:childTnLst>
+                        <p:par>
+                          <p:cTn id="38" fill="hold">
+                            <p:stCondLst>
+                              <p:cond delay="0"/>
+                            </p:stCondLst>
+                            <p:childTnLst>
                               <p:par>
-                                <p:cTn id="31" presetID="1" presetClass="entr" presetSubtype="0" fill="hold" grpId="0" nodeType="withEffect">
+                                <p:cTn id="39" presetID="1" presetClass="entr" presetSubtype="0" fill="hold" grpId="0" nodeType="clickEffect">
                                   <p:stCondLst>
                                     <p:cond delay="0"/>
                                   </p:stCondLst>
                                   <p:childTnLst>
                                     <p:set>
                                       <p:cBhvr>
-                                        <p:cTn id="32" dur="1" fill="hold">
+                                        <p:cTn id="40" dur="1" fill="hold">
                                           <p:stCondLst>
                                             <p:cond delay="0"/>
                                           </p:stCondLst>
                                         </p:cTn>
                                         <p:tgtEl>
-                                          <p:spTgt spid="3">
-                                            <p:txEl>
-                                              <p:pRg st="10" end="10"/>
-                                            </p:txEl>
-                                          </p:spTgt>
+                                          <p:spTgt spid="5"/>
                                         </p:tgtEl>
                                         <p:attrNameLst>
                                           <p:attrName>style.visibility</p:attrName>
@@ -4468,7 +4642,9 @@
       </p:par>
     </p:tnLst>
     <p:bldLst>
-      <p:bldP spid="3" grpId="0" build="p"/>
+      <p:bldP spid="3" grpId="0" uiExpand="1" build="p"/>
+      <p:bldP spid="5" grpId="0" animBg="1"/>
+      <p:bldP spid="6" grpId="0" animBg="1"/>
     </p:bldLst>
   </p:timing>
 </p:sld>
@@ -4508,7 +4684,7 @@
           <a:p>
             <a:r>
               <a:rPr lang="en-US" dirty="0" smtClean="0"/>
-              <a:t>Examples</a:t>
+              <a:t>Function/method documentation</a:t>
             </a:r>
             <a:endParaRPr lang="en-US" dirty="0"/>
           </a:p>
@@ -4531,57 +4707,72 @@
           <a:p>
             <a:r>
               <a:rPr lang="en-US" dirty="0" smtClean="0"/>
-              <a:t>Examples help convey semantics</a:t>
+              <a:t>Document</a:t>
             </a:r>
           </a:p>
           <a:p>
             <a:pPr lvl="1"/>
             <a:r>
               <a:rPr lang="en-US" dirty="0" smtClean="0"/>
-              <a:t>part of good documentation</a:t>
-            </a:r>
-          </a:p>
-          <a:p>
+              <a:t>purpose</a:t>
+            </a:r>
+          </a:p>
+          <a:p>
+            <a:pPr lvl="1"/>
             <a:r>
               <a:rPr lang="en-US" dirty="0" smtClean="0"/>
-              <a:t>Can be used as tests</a:t>
+              <a:t>arguments</a:t>
+            </a:r>
+          </a:p>
+          <a:p>
+            <a:pPr lvl="2"/>
+            <a:r>
+              <a:rPr lang="en-US" dirty="0" smtClean="0"/>
+              <a:t>semantics, units</a:t>
+            </a:r>
+          </a:p>
+          <a:p>
+            <a:pPr lvl="2"/>
+            <a:r>
+              <a:rPr lang="en-US" dirty="0" smtClean="0"/>
+              <a:t>expectations, i.e., preconditions</a:t>
             </a:r>
           </a:p>
           <a:p>
             <a:pPr lvl="1"/>
             <a:r>
               <a:rPr lang="en-US" dirty="0" smtClean="0"/>
-              <a:t>easily check code integrity after changes</a:t>
-            </a:r>
-          </a:p>
-          <a:p>
+              <a:t>return value</a:t>
+            </a:r>
+          </a:p>
+          <a:p>
+            <a:pPr lvl="2"/>
             <a:r>
               <a:rPr lang="en-US" dirty="0" smtClean="0"/>
-              <a:t>Python</a:t>
-            </a:r>
+              <a:t>semantics, units</a:t>
+            </a:r>
+          </a:p>
+          <a:p>
+            <a:pPr lvl="2"/>
+            <a:r>
+              <a:rPr lang="en-US" dirty="0" smtClean="0"/>
+              <a:t>guarantees, i.e., </a:t>
+            </a:r>
+            <a:r>
+              <a:rPr lang="en-US" dirty="0" err="1" smtClean="0"/>
+              <a:t>postconditions</a:t>
+            </a:r>
+            <a:endParaRPr lang="en-US" dirty="0" smtClean="0"/>
           </a:p>
           <a:p>
             <a:pPr lvl="1"/>
             <a:r>
-              <a:rPr lang="en-US" dirty="0" err="1" smtClean="0"/>
-              <a:t>doctest</a:t>
-            </a:r>
-            <a:endParaRPr lang="en-US" dirty="0" smtClean="0"/>
-          </a:p>
-          <a:p>
-            <a:pPr lvl="1"/>
-            <a:r>
-              <a:rPr lang="en-US" dirty="0" err="1" smtClean="0"/>
-              <a:t>unittest</a:t>
-            </a:r>
-            <a:endParaRPr lang="en-US" dirty="0" smtClean="0"/>
-          </a:p>
-          <a:p>
-            <a:pPr lvl="1"/>
-            <a:r>
               <a:rPr lang="en-US" dirty="0" smtClean="0"/>
-              <a:t>nose</a:t>
-            </a:r>
+              <a:t>error conditions, i.e., exceptions</a:t>
+            </a:r>
+          </a:p>
+          <a:p>
+            <a:pPr lvl="2"/>
             <a:endParaRPr lang="en-US" dirty="0"/>
           </a:p>
         </p:txBody>
@@ -4601,9 +4792,804 @@
           <a:bodyPr/>
           <a:lstStyle/>
           <a:p>
+            <a:fld id="{BDD65314-B0AE-428C-9440-AF3587EB0BBA}" type="slidenum">
+              <a:rPr lang="nl-BE" smtClean="0"/>
+              <a:t>11</a:t>
+            </a:fld>
+            <a:endParaRPr lang="nl-BE"/>
+          </a:p>
+        </p:txBody>
+      </p:sp>
+    </p:spTree>
+    <p:extLst>
+      <p:ext uri="{BB962C8B-B14F-4D97-AF65-F5344CB8AC3E}">
+        <p14:creationId xmlns:p14="http://schemas.microsoft.com/office/powerpoint/2010/main" val="1378687234"/>
+      </p:ext>
+    </p:extLst>
+  </p:cSld>
+  <p:clrMapOvr>
+    <a:masterClrMapping/>
+  </p:clrMapOvr>
+  <p:timing>
+    <p:tnLst>
+      <p:par>
+        <p:cTn id="1" dur="indefinite" restart="never" nodeType="tmRoot"/>
+      </p:par>
+    </p:tnLst>
+  </p:timing>
+</p:sld>
+</file>
+
+<file path=ppt/slides/slide12.xml><?xml version="1.0" encoding="utf-8"?>
+<p:sld xmlns:a="http://schemas.openxmlformats.org/drawingml/2006/main" xmlns:r="http://schemas.openxmlformats.org/officeDocument/2006/relationships" xmlns:p="http://schemas.openxmlformats.org/presentationml/2006/main">
+  <p:cSld>
+    <p:spTree>
+      <p:nvGrpSpPr>
+        <p:cNvPr id="1" name=""/>
+        <p:cNvGrpSpPr/>
+        <p:nvPr/>
+      </p:nvGrpSpPr>
+      <p:grpSpPr>
+        <a:xfrm>
+          <a:off x="0" y="0"/>
+          <a:ext cx="0" cy="0"/>
+          <a:chOff x="0" y="0"/>
+          <a:chExt cx="0" cy="0"/>
+        </a:xfrm>
+      </p:grpSpPr>
+      <p:sp>
+        <p:nvSpPr>
+          <p:cNvPr id="2" name="Title 1"/>
+          <p:cNvSpPr>
+            <a:spLocks noGrp="1"/>
+          </p:cNvSpPr>
+          <p:nvPr>
+            <p:ph type="title"/>
+          </p:nvPr>
+        </p:nvSpPr>
+        <p:spPr/>
+        <p:txBody>
+          <a:bodyPr/>
+          <a:lstStyle/>
+          <a:p>
+            <a:r>
+              <a:rPr lang="en-US" dirty="0" smtClean="0"/>
+              <a:t>Example function documentation</a:t>
+            </a:r>
+            <a:endParaRPr lang="en-US" dirty="0"/>
+          </a:p>
+        </p:txBody>
+      </p:sp>
+      <p:sp>
+        <p:nvSpPr>
+          <p:cNvPr id="4" name="Slide Number Placeholder 3"/>
+          <p:cNvSpPr>
+            <a:spLocks noGrp="1"/>
+          </p:cNvSpPr>
+          <p:nvPr>
+            <p:ph type="sldNum" sz="quarter" idx="12"/>
+          </p:nvPr>
+        </p:nvSpPr>
+        <p:spPr/>
+        <p:txBody>
+          <a:bodyPr/>
+          <a:lstStyle/>
+          <a:p>
+            <a:fld id="{BDD65314-B0AE-428C-9440-AF3587EB0BBA}" type="slidenum">
+              <a:rPr lang="nl-BE" smtClean="0"/>
+              <a:t>12</a:t>
+            </a:fld>
+            <a:endParaRPr lang="nl-BE"/>
+          </a:p>
+        </p:txBody>
+      </p:sp>
+      <p:sp>
+        <p:nvSpPr>
+          <p:cNvPr id="5" name="TextBox 4"/>
+          <p:cNvSpPr txBox="1"/>
+          <p:nvPr/>
+        </p:nvSpPr>
+        <p:spPr>
+          <a:xfrm>
+            <a:off x="559523" y="1628800"/>
+            <a:ext cx="8024954" cy="3970318"/>
+          </a:xfrm>
+          <a:prstGeom prst="rect">
+            <a:avLst/>
+          </a:prstGeom>
+          <a:solidFill>
+            <a:schemeClr val="bg1">
+              <a:lumMod val="75000"/>
+            </a:schemeClr>
+          </a:solidFill>
+          <a:ln>
+            <a:solidFill>
+              <a:schemeClr val="tx1"/>
+            </a:solidFill>
+          </a:ln>
+        </p:spPr>
+        <p:txBody>
+          <a:bodyPr wrap="none" rtlCol="0">
+            <a:spAutoFit/>
+          </a:bodyPr>
+          <a:lstStyle/>
+          <a:p>
+            <a:r>
+              <a:rPr lang="en-US" sz="1400" dirty="0">
+                <a:latin typeface="Courier New" panose="02070309020205020404" pitchFamily="49" charset="0"/>
+                <a:cs typeface="Courier New" panose="02070309020205020404" pitchFamily="49" charset="0"/>
+              </a:rPr>
+              <a:t>/*!</a:t>
+            </a:r>
+          </a:p>
+          <a:p>
+            <a:r>
+              <a:rPr lang="en-US" sz="1400" dirty="0">
+                <a:latin typeface="Courier New" panose="02070309020205020404" pitchFamily="49" charset="0"/>
+                <a:cs typeface="Courier New" panose="02070309020205020404" pitchFamily="49" charset="0"/>
+              </a:rPr>
+              <a:t>  \brief Node constructor, will allocate the node itself, all data</a:t>
+            </a:r>
+          </a:p>
+          <a:p>
+            <a:r>
+              <a:rPr lang="en-US" sz="1400" dirty="0">
+                <a:latin typeface="Courier New" panose="02070309020205020404" pitchFamily="49" charset="0"/>
+                <a:cs typeface="Courier New" panose="02070309020205020404" pitchFamily="49" charset="0"/>
+              </a:rPr>
+              <a:t>         structures required for a node without points inserted into</a:t>
+            </a:r>
+          </a:p>
+          <a:p>
+            <a:r>
+              <a:rPr lang="en-US" sz="1400" dirty="0">
+                <a:latin typeface="Courier New" panose="02070309020205020404" pitchFamily="49" charset="0"/>
+                <a:cs typeface="Courier New" panose="02070309020205020404" pitchFamily="49" charset="0"/>
+              </a:rPr>
+              <a:t>         it, and initialize all members</a:t>
+            </a:r>
+          </a:p>
+          <a:p>
+            <a:r>
+              <a:rPr lang="en-US" sz="1400" dirty="0">
+                <a:latin typeface="Courier New" panose="02070309020205020404" pitchFamily="49" charset="0"/>
+                <a:cs typeface="Courier New" panose="02070309020205020404" pitchFamily="49" charset="0"/>
+              </a:rPr>
+              <a:t>  \</a:t>
+            </a:r>
+            <a:r>
+              <a:rPr lang="en-US" sz="1400" dirty="0" err="1">
+                <a:latin typeface="Courier New" panose="02070309020205020404" pitchFamily="49" charset="0"/>
+                <a:cs typeface="Courier New" panose="02070309020205020404" pitchFamily="49" charset="0"/>
+              </a:rPr>
+              <a:t>param</a:t>
+            </a:r>
+            <a:r>
+              <a:rPr lang="en-US" sz="1400" dirty="0">
+                <a:latin typeface="Courier New" panose="02070309020205020404" pitchFamily="49" charset="0"/>
+                <a:cs typeface="Courier New" panose="02070309020205020404" pitchFamily="49" charset="0"/>
+              </a:rPr>
+              <a:t> node Double dereferenced pointer to the node to be allocated</a:t>
+            </a:r>
+          </a:p>
+          <a:p>
+            <a:r>
+              <a:rPr lang="en-US" sz="1400" dirty="0">
+                <a:latin typeface="Courier New" panose="02070309020205020404" pitchFamily="49" charset="0"/>
+                <a:cs typeface="Courier New" panose="02070309020205020404" pitchFamily="49" charset="0"/>
+              </a:rPr>
+              <a:t>              and initialized.</a:t>
+            </a:r>
+          </a:p>
+          <a:p>
+            <a:r>
+              <a:rPr lang="en-US" sz="1400" dirty="0">
+                <a:latin typeface="Courier New" panose="02070309020205020404" pitchFamily="49" charset="0"/>
+                <a:cs typeface="Courier New" panose="02070309020205020404" pitchFamily="49" charset="0"/>
+              </a:rPr>
+              <a:t>  \</a:t>
+            </a:r>
+            <a:r>
+              <a:rPr lang="en-US" sz="1400" dirty="0" err="1">
+                <a:latin typeface="Courier New" panose="02070309020205020404" pitchFamily="49" charset="0"/>
+                <a:cs typeface="Courier New" panose="02070309020205020404" pitchFamily="49" charset="0"/>
+              </a:rPr>
+              <a:t>param</a:t>
+            </a:r>
+            <a:r>
+              <a:rPr lang="en-US" sz="1400" dirty="0">
+                <a:latin typeface="Courier New" panose="02070309020205020404" pitchFamily="49" charset="0"/>
+                <a:cs typeface="Courier New" panose="02070309020205020404" pitchFamily="49" charset="0"/>
+              </a:rPr>
+              <a:t> tree Address of the tree the node is part off.</a:t>
+            </a:r>
+          </a:p>
+          <a:p>
+            <a:r>
+              <a:rPr lang="en-US" sz="1400" dirty="0">
+                <a:latin typeface="Courier New" panose="02070309020205020404" pitchFamily="49" charset="0"/>
+                <a:cs typeface="Courier New" panose="02070309020205020404" pitchFamily="49" charset="0"/>
+              </a:rPr>
+              <a:t>  \</a:t>
+            </a:r>
+            <a:r>
+              <a:rPr lang="en-US" sz="1400" dirty="0" err="1">
+                <a:latin typeface="Courier New" panose="02070309020205020404" pitchFamily="49" charset="0"/>
+                <a:cs typeface="Courier New" panose="02070309020205020404" pitchFamily="49" charset="0"/>
+              </a:rPr>
+              <a:t>param</a:t>
+            </a:r>
+            <a:r>
+              <a:rPr lang="en-US" sz="1400" dirty="0">
+                <a:latin typeface="Courier New" panose="02070309020205020404" pitchFamily="49" charset="0"/>
+                <a:cs typeface="Courier New" panose="02070309020205020404" pitchFamily="49" charset="0"/>
+              </a:rPr>
+              <a:t> center An array of size rank containing the </a:t>
+            </a:r>
+            <a:r>
+              <a:rPr lang="en-US" sz="1400" dirty="0" smtClean="0">
+                <a:latin typeface="Courier New" panose="02070309020205020404" pitchFamily="49" charset="0"/>
+                <a:cs typeface="Courier New" panose="02070309020205020404" pitchFamily="49" charset="0"/>
+              </a:rPr>
+              <a:t>coordinates </a:t>
+            </a:r>
+            <a:r>
+              <a:rPr lang="en-US" sz="1400" dirty="0">
+                <a:latin typeface="Courier New" panose="02070309020205020404" pitchFamily="49" charset="0"/>
+                <a:cs typeface="Courier New" panose="02070309020205020404" pitchFamily="49" charset="0"/>
+              </a:rPr>
+              <a:t>of the</a:t>
+            </a:r>
+          </a:p>
+          <a:p>
+            <a:r>
+              <a:rPr lang="en-US" sz="1400" dirty="0">
+                <a:latin typeface="Courier New" panose="02070309020205020404" pitchFamily="49" charset="0"/>
+                <a:cs typeface="Courier New" panose="02070309020205020404" pitchFamily="49" charset="0"/>
+              </a:rPr>
+              <a:t>         </a:t>
+            </a:r>
+            <a:r>
+              <a:rPr lang="en-US" sz="1400" dirty="0" smtClean="0">
+                <a:latin typeface="Courier New" panose="02070309020205020404" pitchFamily="49" charset="0"/>
+                <a:cs typeface="Courier New" panose="02070309020205020404" pitchFamily="49" charset="0"/>
+              </a:rPr>
+              <a:t>       new </a:t>
+            </a:r>
+            <a:r>
+              <a:rPr lang="en-US" sz="1400" dirty="0">
+                <a:latin typeface="Courier New" panose="02070309020205020404" pitchFamily="49" charset="0"/>
+                <a:cs typeface="Courier New" panose="02070309020205020404" pitchFamily="49" charset="0"/>
+              </a:rPr>
+              <a:t>node's center as double precision numbers,</a:t>
+            </a:r>
+          </a:p>
+          <a:p>
+            <a:r>
+              <a:rPr lang="en-US" sz="1400" dirty="0">
+                <a:latin typeface="Courier New" panose="02070309020205020404" pitchFamily="49" charset="0"/>
+                <a:cs typeface="Courier New" panose="02070309020205020404" pitchFamily="49" charset="0"/>
+              </a:rPr>
+              <a:t>  \</a:t>
+            </a:r>
+            <a:r>
+              <a:rPr lang="en-US" sz="1400" dirty="0" err="1">
+                <a:latin typeface="Courier New" panose="02070309020205020404" pitchFamily="49" charset="0"/>
+                <a:cs typeface="Courier New" panose="02070309020205020404" pitchFamily="49" charset="0"/>
+              </a:rPr>
+              <a:t>param</a:t>
+            </a:r>
+            <a:r>
+              <a:rPr lang="en-US" sz="1400" dirty="0">
+                <a:latin typeface="Courier New" panose="02070309020205020404" pitchFamily="49" charset="0"/>
+                <a:cs typeface="Courier New" panose="02070309020205020404" pitchFamily="49" charset="0"/>
+              </a:rPr>
+              <a:t> extent An array of size rank containing the extent for each</a:t>
+            </a:r>
+          </a:p>
+          <a:p>
+            <a:r>
+              <a:rPr lang="en-US" sz="1400" dirty="0">
+                <a:latin typeface="Courier New" panose="02070309020205020404" pitchFamily="49" charset="0"/>
+                <a:cs typeface="Courier New" panose="02070309020205020404" pitchFamily="49" charset="0"/>
+              </a:rPr>
+              <a:t>         </a:t>
+            </a:r>
+            <a:r>
+              <a:rPr lang="en-US" sz="1400" dirty="0" smtClean="0">
+                <a:latin typeface="Courier New" panose="02070309020205020404" pitchFamily="49" charset="0"/>
+                <a:cs typeface="Courier New" panose="02070309020205020404" pitchFamily="49" charset="0"/>
+              </a:rPr>
+              <a:t>       dimension </a:t>
+            </a:r>
+            <a:r>
+              <a:rPr lang="en-US" sz="1400" dirty="0">
+                <a:latin typeface="Courier New" panose="02070309020205020404" pitchFamily="49" charset="0"/>
+                <a:cs typeface="Courier New" panose="02070309020205020404" pitchFamily="49" charset="0"/>
+              </a:rPr>
+              <a:t>for the new node as double precision numbers,</a:t>
+            </a:r>
+          </a:p>
+          <a:p>
+            <a:r>
+              <a:rPr lang="en-US" sz="1400" dirty="0">
+                <a:latin typeface="Courier New" panose="02070309020205020404" pitchFamily="49" charset="0"/>
+                <a:cs typeface="Courier New" panose="02070309020205020404" pitchFamily="49" charset="0"/>
+              </a:rPr>
+              <a:t>  \return TREE_2K_SUCCESS if the allocation and initialization succeeded,</a:t>
+            </a:r>
+          </a:p>
+          <a:p>
+            <a:r>
+              <a:rPr lang="en-US" sz="1400" dirty="0">
+                <a:latin typeface="Courier New" panose="02070309020205020404" pitchFamily="49" charset="0"/>
+                <a:cs typeface="Courier New" panose="02070309020205020404" pitchFamily="49" charset="0"/>
+              </a:rPr>
+              <a:t>          an error code otherwise.</a:t>
+            </a:r>
+          </a:p>
+          <a:p>
+            <a:r>
+              <a:rPr lang="en-US" sz="1400" dirty="0">
+                <a:latin typeface="Courier New" panose="02070309020205020404" pitchFamily="49" charset="0"/>
+                <a:cs typeface="Courier New" panose="02070309020205020404" pitchFamily="49" charset="0"/>
+              </a:rPr>
+              <a:t>*/</a:t>
+            </a:r>
+          </a:p>
+          <a:p>
+            <a:r>
+              <a:rPr lang="en-US" sz="1400" dirty="0">
+                <a:latin typeface="Courier New" panose="02070309020205020404" pitchFamily="49" charset="0"/>
+                <a:cs typeface="Courier New" panose="02070309020205020404" pitchFamily="49" charset="0"/>
+              </a:rPr>
+              <a:t>tree_2k_err_t node_2k_alloc(node_2k_t **node, tree_2k_t *tree,</a:t>
+            </a:r>
+          </a:p>
+          <a:p>
+            <a:r>
+              <a:rPr lang="en-US" sz="1400" dirty="0">
+                <a:latin typeface="Courier New" panose="02070309020205020404" pitchFamily="49" charset="0"/>
+                <a:cs typeface="Courier New" panose="02070309020205020404" pitchFamily="49" charset="0"/>
+              </a:rPr>
+              <a:t>                            double *center, double *extent) </a:t>
+            </a:r>
+            <a:r>
+              <a:rPr lang="en-US" sz="1400" dirty="0" smtClean="0">
+                <a:latin typeface="Courier New" panose="02070309020205020404" pitchFamily="49" charset="0"/>
+                <a:cs typeface="Courier New" panose="02070309020205020404" pitchFamily="49" charset="0"/>
+              </a:rPr>
+              <a:t>{</a:t>
+            </a:r>
+          </a:p>
+          <a:p>
+            <a:r>
+              <a:rPr lang="en-US" sz="1400" dirty="0" smtClean="0">
+                <a:latin typeface="Courier New" panose="02070309020205020404" pitchFamily="49" charset="0"/>
+                <a:cs typeface="Courier New" panose="02070309020205020404" pitchFamily="49" charset="0"/>
+              </a:rPr>
+              <a:t>…</a:t>
+            </a:r>
+          </a:p>
+          <a:p>
+            <a:r>
+              <a:rPr lang="en-US" sz="1400" dirty="0">
+                <a:latin typeface="Courier New" panose="02070309020205020404" pitchFamily="49" charset="0"/>
+                <a:cs typeface="Courier New" panose="02070309020205020404" pitchFamily="49" charset="0"/>
+              </a:rPr>
+              <a:t>}</a:t>
+            </a:r>
+          </a:p>
+        </p:txBody>
+      </p:sp>
+      <p:sp>
+        <p:nvSpPr>
+          <p:cNvPr id="6" name="TextBox 5"/>
+          <p:cNvSpPr txBox="1"/>
+          <p:nvPr/>
+        </p:nvSpPr>
+        <p:spPr>
+          <a:xfrm>
+            <a:off x="5364088" y="5877272"/>
+            <a:ext cx="1659109" cy="369332"/>
+          </a:xfrm>
+          <a:prstGeom prst="rect">
+            <a:avLst/>
+          </a:prstGeom>
+          <a:noFill/>
+          <a:ln>
+            <a:solidFill>
+              <a:schemeClr val="tx1"/>
+            </a:solidFill>
+          </a:ln>
+        </p:spPr>
+        <p:txBody>
+          <a:bodyPr wrap="none" rtlCol="0">
+            <a:spAutoFit/>
+          </a:bodyPr>
+          <a:lstStyle/>
+          <a:p>
+            <a:r>
+              <a:rPr lang="en-US" dirty="0" err="1" smtClean="0"/>
+              <a:t>doxygen</a:t>
+            </a:r>
+            <a:r>
+              <a:rPr lang="en-US" dirty="0" smtClean="0"/>
+              <a:t> format</a:t>
+            </a:r>
+            <a:endParaRPr lang="en-US" dirty="0"/>
+          </a:p>
+        </p:txBody>
+      </p:sp>
+    </p:spTree>
+    <p:extLst>
+      <p:ext uri="{BB962C8B-B14F-4D97-AF65-F5344CB8AC3E}">
+        <p14:creationId xmlns:p14="http://schemas.microsoft.com/office/powerpoint/2010/main" val="2685786811"/>
+      </p:ext>
+    </p:extLst>
+  </p:cSld>
+  <p:clrMapOvr>
+    <a:masterClrMapping/>
+  </p:clrMapOvr>
+  <p:timing>
+    <p:tnLst>
+      <p:par>
+        <p:cTn id="1" dur="indefinite" restart="never" nodeType="tmRoot">
+          <p:childTnLst>
+            <p:seq concurrent="1" nextAc="seek">
+              <p:cTn id="2" dur="indefinite" nodeType="mainSeq">
+                <p:childTnLst>
+                  <p:par>
+                    <p:cTn id="3" fill="hold">
+                      <p:stCondLst>
+                        <p:cond delay="indefinite"/>
+                      </p:stCondLst>
+                      <p:childTnLst>
+                        <p:par>
+                          <p:cTn id="4" fill="hold">
+                            <p:stCondLst>
+                              <p:cond delay="0"/>
+                            </p:stCondLst>
+                            <p:childTnLst>
+                              <p:par>
+                                <p:cTn id="5" presetID="1" presetClass="entr" presetSubtype="0" fill="hold" grpId="0" nodeType="clickEffect">
+                                  <p:stCondLst>
+                                    <p:cond delay="0"/>
+                                  </p:stCondLst>
+                                  <p:childTnLst>
+                                    <p:set>
+                                      <p:cBhvr>
+                                        <p:cTn id="6" dur="1" fill="hold">
+                                          <p:stCondLst>
+                                            <p:cond delay="0"/>
+                                          </p:stCondLst>
+                                        </p:cTn>
+                                        <p:tgtEl>
+                                          <p:spTgt spid="5"/>
+                                        </p:tgtEl>
+                                        <p:attrNameLst>
+                                          <p:attrName>style.visibility</p:attrName>
+                                        </p:attrNameLst>
+                                      </p:cBhvr>
+                                      <p:to>
+                                        <p:strVal val="visible"/>
+                                      </p:to>
+                                    </p:set>
+                                  </p:childTnLst>
+                                </p:cTn>
+                              </p:par>
+                            </p:childTnLst>
+                          </p:cTn>
+                        </p:par>
+                      </p:childTnLst>
+                    </p:cTn>
+                  </p:par>
+                </p:childTnLst>
+              </p:cTn>
+              <p:prevCondLst>
+                <p:cond evt="onPrev" delay="0">
+                  <p:tgtEl>
+                    <p:sldTgt/>
+                  </p:tgtEl>
+                </p:cond>
+              </p:prevCondLst>
+              <p:nextCondLst>
+                <p:cond evt="onNext" delay="0">
+                  <p:tgtEl>
+                    <p:sldTgt/>
+                  </p:tgtEl>
+                </p:cond>
+              </p:nextCondLst>
+            </p:seq>
+          </p:childTnLst>
+        </p:cTn>
+      </p:par>
+    </p:tnLst>
+    <p:bldLst>
+      <p:bldP spid="5" grpId="0" animBg="1"/>
+    </p:bldLst>
+  </p:timing>
+</p:sld>
+</file>
+
+<file path=ppt/slides/slide13.xml><?xml version="1.0" encoding="utf-8"?>
+<p:sld xmlns:a="http://schemas.openxmlformats.org/drawingml/2006/main" xmlns:r="http://schemas.openxmlformats.org/officeDocument/2006/relationships" xmlns:p="http://schemas.openxmlformats.org/presentationml/2006/main">
+  <p:cSld>
+    <p:spTree>
+      <p:nvGrpSpPr>
+        <p:cNvPr id="1" name=""/>
+        <p:cNvGrpSpPr/>
+        <p:nvPr/>
+      </p:nvGrpSpPr>
+      <p:grpSpPr>
+        <a:xfrm>
+          <a:off x="0" y="0"/>
+          <a:ext cx="0" cy="0"/>
+          <a:chOff x="0" y="0"/>
+          <a:chExt cx="0" cy="0"/>
+        </a:xfrm>
+      </p:grpSpPr>
+      <p:sp>
+        <p:nvSpPr>
+          <p:cNvPr id="2" name="Title 1"/>
+          <p:cNvSpPr>
+            <a:spLocks noGrp="1"/>
+          </p:cNvSpPr>
+          <p:nvPr>
+            <p:ph type="title"/>
+          </p:nvPr>
+        </p:nvSpPr>
+        <p:spPr/>
+        <p:txBody>
+          <a:bodyPr/>
+          <a:lstStyle/>
+          <a:p>
+            <a:r>
+              <a:rPr lang="en-US" dirty="0" smtClean="0"/>
+              <a:t>Class documentation</a:t>
+            </a:r>
+            <a:endParaRPr lang="en-US" dirty="0"/>
+          </a:p>
+        </p:txBody>
+      </p:sp>
+      <p:sp>
+        <p:nvSpPr>
+          <p:cNvPr id="3" name="Content Placeholder 2"/>
+          <p:cNvSpPr>
+            <a:spLocks noGrp="1"/>
+          </p:cNvSpPr>
+          <p:nvPr>
+            <p:ph idx="1"/>
+          </p:nvPr>
+        </p:nvSpPr>
+        <p:spPr/>
+        <p:txBody>
+          <a:bodyPr/>
+          <a:lstStyle/>
+          <a:p>
+            <a:r>
+              <a:rPr lang="en-US" dirty="0" smtClean="0"/>
+              <a:t>Document</a:t>
+            </a:r>
+          </a:p>
+          <a:p>
+            <a:pPr lvl="1"/>
+            <a:r>
+              <a:rPr lang="en-US" dirty="0" smtClean="0"/>
+              <a:t>purpose</a:t>
+            </a:r>
+          </a:p>
+          <a:p>
+            <a:pPr lvl="1"/>
+            <a:r>
+              <a:rPr lang="en-US" dirty="0" smtClean="0"/>
+              <a:t>attributes</a:t>
+            </a:r>
+          </a:p>
+          <a:p>
+            <a:pPr lvl="2"/>
+            <a:r>
+              <a:rPr lang="en-US" dirty="0" smtClean="0"/>
+              <a:t>semantics, units</a:t>
+            </a:r>
+          </a:p>
+          <a:p>
+            <a:pPr lvl="2"/>
+            <a:r>
+              <a:rPr lang="en-US" dirty="0" smtClean="0"/>
+              <a:t>expectations, i.e., invariants</a:t>
+            </a:r>
+          </a:p>
+          <a:p>
+            <a:pPr lvl="1"/>
+            <a:r>
+              <a:rPr lang="en-US" dirty="0" smtClean="0"/>
+              <a:t>methods</a:t>
+            </a:r>
+          </a:p>
+          <a:p>
+            <a:pPr lvl="2"/>
+            <a:endParaRPr lang="en-US" dirty="0"/>
+          </a:p>
+        </p:txBody>
+      </p:sp>
+      <p:sp>
+        <p:nvSpPr>
+          <p:cNvPr id="4" name="Slide Number Placeholder 3"/>
+          <p:cNvSpPr>
+            <a:spLocks noGrp="1"/>
+          </p:cNvSpPr>
+          <p:nvPr>
+            <p:ph type="sldNum" sz="quarter" idx="12"/>
+          </p:nvPr>
+        </p:nvSpPr>
+        <p:spPr/>
+        <p:txBody>
+          <a:bodyPr/>
+          <a:lstStyle/>
+          <a:p>
+            <a:fld id="{BDD65314-B0AE-428C-9440-AF3587EB0BBA}" type="slidenum">
+              <a:rPr lang="nl-BE" smtClean="0"/>
+              <a:t>13</a:t>
+            </a:fld>
+            <a:endParaRPr lang="nl-BE"/>
+          </a:p>
+        </p:txBody>
+      </p:sp>
+    </p:spTree>
+    <p:extLst>
+      <p:ext uri="{BB962C8B-B14F-4D97-AF65-F5344CB8AC3E}">
+        <p14:creationId xmlns:p14="http://schemas.microsoft.com/office/powerpoint/2010/main" val="2537914684"/>
+      </p:ext>
+    </p:extLst>
+  </p:cSld>
+  <p:clrMapOvr>
+    <a:masterClrMapping/>
+  </p:clrMapOvr>
+  <p:timing>
+    <p:tnLst>
+      <p:par>
+        <p:cTn id="1" dur="indefinite" restart="never" nodeType="tmRoot"/>
+      </p:par>
+    </p:tnLst>
+  </p:timing>
+</p:sld>
+</file>
+
+<file path=ppt/slides/slide14.xml><?xml version="1.0" encoding="utf-8"?>
+<p:sld xmlns:a="http://schemas.openxmlformats.org/drawingml/2006/main" xmlns:r="http://schemas.openxmlformats.org/officeDocument/2006/relationships" xmlns:p="http://schemas.openxmlformats.org/presentationml/2006/main">
+  <p:cSld>
+    <p:spTree>
+      <p:nvGrpSpPr>
+        <p:cNvPr id="1" name=""/>
+        <p:cNvGrpSpPr/>
+        <p:nvPr/>
+      </p:nvGrpSpPr>
+      <p:grpSpPr>
+        <a:xfrm>
+          <a:off x="0" y="0"/>
+          <a:ext cx="0" cy="0"/>
+          <a:chOff x="0" y="0"/>
+          <a:chExt cx="0" cy="0"/>
+        </a:xfrm>
+      </p:grpSpPr>
+      <p:sp>
+        <p:nvSpPr>
+          <p:cNvPr id="2" name="Title 1"/>
+          <p:cNvSpPr>
+            <a:spLocks noGrp="1"/>
+          </p:cNvSpPr>
+          <p:nvPr>
+            <p:ph type="title"/>
+          </p:nvPr>
+        </p:nvSpPr>
+        <p:spPr/>
+        <p:txBody>
+          <a:bodyPr/>
+          <a:lstStyle/>
+          <a:p>
+            <a:r>
+              <a:rPr lang="en-US" dirty="0" smtClean="0"/>
+              <a:t>Usage e</a:t>
+            </a:r>
+            <a:r>
+              <a:rPr lang="en-US" dirty="0" smtClean="0"/>
+              <a:t>xamples</a:t>
+            </a:r>
+            <a:endParaRPr lang="en-US" dirty="0"/>
+          </a:p>
+        </p:txBody>
+      </p:sp>
+      <p:sp>
+        <p:nvSpPr>
+          <p:cNvPr id="3" name="Content Placeholder 2"/>
+          <p:cNvSpPr>
+            <a:spLocks noGrp="1"/>
+          </p:cNvSpPr>
+          <p:nvPr>
+            <p:ph idx="1"/>
+          </p:nvPr>
+        </p:nvSpPr>
+        <p:spPr/>
+        <p:txBody>
+          <a:bodyPr/>
+          <a:lstStyle/>
+          <a:p>
+            <a:r>
+              <a:rPr lang="en-US" dirty="0" smtClean="0"/>
+              <a:t>Examples help convey semantics</a:t>
+            </a:r>
+          </a:p>
+          <a:p>
+            <a:pPr lvl="1"/>
+            <a:r>
+              <a:rPr lang="en-US" dirty="0" smtClean="0"/>
+              <a:t>part of good documentation</a:t>
+            </a:r>
+          </a:p>
+          <a:p>
+            <a:r>
+              <a:rPr lang="en-US" dirty="0" smtClean="0"/>
+              <a:t>Can be used as tests</a:t>
+            </a:r>
+          </a:p>
+          <a:p>
+            <a:pPr lvl="1"/>
+            <a:r>
+              <a:rPr lang="en-US" dirty="0" smtClean="0"/>
+              <a:t>easily check code integrity after changes</a:t>
+            </a:r>
+          </a:p>
+          <a:p>
+            <a:r>
+              <a:rPr lang="en-US" dirty="0" smtClean="0"/>
+              <a:t>Python</a:t>
+            </a:r>
+          </a:p>
+          <a:p>
+            <a:pPr lvl="1"/>
+            <a:r>
+              <a:rPr lang="en-US" dirty="0" err="1" smtClean="0"/>
+              <a:t>doctest</a:t>
+            </a:r>
+            <a:endParaRPr lang="en-US" dirty="0" smtClean="0"/>
+          </a:p>
+          <a:p>
+            <a:pPr lvl="1"/>
+            <a:r>
+              <a:rPr lang="en-US" dirty="0" err="1" smtClean="0"/>
+              <a:t>unittest</a:t>
+            </a:r>
+            <a:endParaRPr lang="en-US" dirty="0" smtClean="0"/>
+          </a:p>
+          <a:p>
+            <a:pPr lvl="1"/>
+            <a:r>
+              <a:rPr lang="en-US" dirty="0" smtClean="0"/>
+              <a:t>nose</a:t>
+            </a:r>
+            <a:endParaRPr lang="en-US" dirty="0"/>
+          </a:p>
+        </p:txBody>
+      </p:sp>
+      <p:sp>
+        <p:nvSpPr>
+          <p:cNvPr id="4" name="Slide Number Placeholder 3"/>
+          <p:cNvSpPr>
+            <a:spLocks noGrp="1"/>
+          </p:cNvSpPr>
+          <p:nvPr>
+            <p:ph type="sldNum" sz="quarter" idx="12"/>
+          </p:nvPr>
+        </p:nvSpPr>
+        <p:spPr/>
+        <p:txBody>
+          <a:bodyPr/>
+          <a:lstStyle/>
+          <a:p>
             <a:fld id="{1C1CB5B1-7AB8-4189-884D-6F6B0BA55CB4}" type="slidenum">
               <a:rPr lang="en-US" smtClean="0"/>
-              <a:t>11</a:t>
+              <a:t>14</a:t>
             </a:fld>
             <a:endParaRPr lang="en-US"/>
           </a:p>
@@ -4960,7 +5946,7 @@
 </p:sld>
 </file>
 
-<file path=ppt/slides/slide12.xml><?xml version="1.0" encoding="utf-8"?>
+<file path=ppt/slides/slide15.xml><?xml version="1.0" encoding="utf-8"?>
 <p:sld xmlns:a="http://schemas.openxmlformats.org/drawingml/2006/main" xmlns:r="http://schemas.openxmlformats.org/officeDocument/2006/relationships" xmlns:p="http://schemas.openxmlformats.org/presentationml/2006/main">
   <p:cSld>
     <p:spTree>
@@ -5012,89 +5998,126 @@
         </p:nvSpPr>
         <p:spPr/>
         <p:txBody>
-          <a:bodyPr/>
-          <a:lstStyle/>
-          <a:p>
-            <a:r>
-              <a:rPr lang="en-US" dirty="0" smtClean="0"/>
-              <a:t>Version Control System</a:t>
-            </a:r>
-          </a:p>
-          <a:p>
-            <a:pPr lvl="1"/>
-            <a:r>
-              <a:rPr lang="en-US" dirty="0" smtClean="0"/>
-              <a:t>issue tracking</a:t>
-            </a:r>
-          </a:p>
-          <a:p>
-            <a:pPr lvl="1"/>
-            <a:r>
-              <a:rPr lang="en-US" dirty="0" smtClean="0"/>
-              <a:t>"backup"</a:t>
-            </a:r>
-          </a:p>
-          <a:p>
-            <a:r>
-              <a:rPr lang="en-US" dirty="0" smtClean="0"/>
-              <a:t>Wiki, OneNote, Google Keep</a:t>
-            </a:r>
-          </a:p>
-          <a:p>
-            <a:r>
-              <a:rPr lang="en-US" dirty="0" err="1" smtClean="0"/>
-              <a:t>Jupyter</a:t>
-            </a:r>
-            <a:r>
-              <a:rPr lang="en-US" dirty="0" smtClean="0"/>
-              <a:t> notebooks</a:t>
-            </a:r>
-          </a:p>
-          <a:p>
-            <a:r>
-              <a:rPr lang="en-US" dirty="0" smtClean="0"/>
-              <a:t>Diagrams</a:t>
-            </a:r>
-            <a:endParaRPr lang="en-US" dirty="0"/>
-          </a:p>
-        </p:txBody>
-      </p:sp>
-      <p:sp>
-        <p:nvSpPr>
-          <p:cNvPr id="4" name="TextBox 3"/>
-          <p:cNvSpPr txBox="1"/>
-          <p:nvPr/>
-        </p:nvSpPr>
-        <p:spPr>
-          <a:xfrm>
-            <a:off x="4977246" y="2275604"/>
-            <a:ext cx="1259319" cy="523220"/>
-          </a:xfrm>
-          <a:prstGeom prst="rect">
-            <a:avLst/>
-          </a:prstGeom>
-          <a:noFill/>
-          <a:ln>
-            <a:solidFill>
-              <a:schemeClr val="tx1"/>
-            </a:solidFill>
-          </a:ln>
-        </p:spPr>
-        <p:txBody>
-          <a:bodyPr wrap="none" rtlCol="0">
-            <a:spAutoFit/>
+          <a:bodyPr>
+            <a:normAutofit fontScale="92500" lnSpcReduction="20000"/>
           </a:bodyPr>
           <a:lstStyle/>
           <a:p>
             <a:r>
-              <a:rPr lang="en-US" sz="2800" dirty="0" smtClean="0"/>
-              <a:t>e.g., </a:t>
-            </a:r>
-            <a:r>
-              <a:rPr lang="en-US" sz="2800" dirty="0" err="1" smtClean="0"/>
+              <a:rPr lang="en-US" dirty="0" smtClean="0"/>
+              <a:t>Version Control </a:t>
+            </a:r>
+            <a:r>
+              <a:rPr lang="en-US" dirty="0" smtClean="0"/>
+              <a:t>System, e.g., </a:t>
+            </a:r>
+            <a:r>
+              <a:rPr lang="en-US" dirty="0" err="1" smtClean="0"/>
               <a:t>git</a:t>
             </a:r>
-            <a:endParaRPr lang="en-US" sz="2800" dirty="0"/>
+            <a:endParaRPr lang="en-US" dirty="0" smtClean="0"/>
+          </a:p>
+          <a:p>
+            <a:pPr lvl="1"/>
+            <a:r>
+              <a:rPr lang="en-US" dirty="0" smtClean="0"/>
+              <a:t>concurrent development</a:t>
+            </a:r>
+          </a:p>
+          <a:p>
+            <a:pPr lvl="1"/>
+            <a:r>
+              <a:rPr lang="en-US" dirty="0" smtClean="0"/>
+              <a:t>documentation of changes</a:t>
+            </a:r>
+            <a:endParaRPr lang="en-US" dirty="0" smtClean="0"/>
+          </a:p>
+          <a:p>
+            <a:r>
+              <a:rPr lang="en-US" dirty="0" smtClean="0"/>
+              <a:t>Online services</a:t>
+            </a:r>
+          </a:p>
+          <a:p>
+            <a:pPr lvl="1"/>
+            <a:r>
+              <a:rPr lang="en-US" dirty="0"/>
+              <a:t>issue tracking</a:t>
+            </a:r>
+          </a:p>
+          <a:p>
+            <a:pPr lvl="1"/>
+            <a:r>
+              <a:rPr lang="en-US" dirty="0"/>
+              <a:t>"backup"</a:t>
+            </a:r>
+          </a:p>
+          <a:p>
+            <a:pPr lvl="1"/>
+            <a:r>
+              <a:rPr lang="en-US" dirty="0"/>
+              <a:t>wiki</a:t>
+            </a:r>
+          </a:p>
+          <a:p>
+            <a:pPr lvl="1"/>
+            <a:r>
+              <a:rPr lang="en-US" dirty="0" smtClean="0"/>
+              <a:t>e.g.,</a:t>
+            </a:r>
+          </a:p>
+          <a:p>
+            <a:pPr lvl="2"/>
+            <a:r>
+              <a:rPr lang="en-US" dirty="0" smtClean="0"/>
+              <a:t>on premise?</a:t>
+            </a:r>
+            <a:endParaRPr lang="en-US" dirty="0" smtClean="0"/>
+          </a:p>
+          <a:p>
+            <a:pPr lvl="2"/>
+            <a:r>
+              <a:rPr lang="en-US" dirty="0"/>
+              <a:t>GitHub (</a:t>
+            </a:r>
+            <a:r>
+              <a:rPr lang="en-US" dirty="0">
+                <a:hlinkClick r:id="rId2"/>
+              </a:rPr>
+              <a:t>https://github.com</a:t>
+            </a:r>
+            <a:r>
+              <a:rPr lang="en-US" dirty="0" smtClean="0">
+                <a:hlinkClick r:id="rId2"/>
+              </a:rPr>
+              <a:t>/</a:t>
+            </a:r>
+            <a:r>
+              <a:rPr lang="en-US" dirty="0" smtClean="0"/>
+              <a:t>)</a:t>
+            </a:r>
+          </a:p>
+          <a:p>
+            <a:pPr lvl="2"/>
+            <a:r>
+              <a:rPr lang="en-US" dirty="0" err="1" smtClean="0"/>
+              <a:t>GitLab</a:t>
+            </a:r>
+            <a:r>
+              <a:rPr lang="en-US" dirty="0" smtClean="0"/>
+              <a:t> (</a:t>
+            </a:r>
+            <a:r>
+              <a:rPr lang="en-US" dirty="0" smtClean="0">
+                <a:hlinkClick r:id="rId3"/>
+              </a:rPr>
+              <a:t>https://gitlab.com/</a:t>
+            </a:r>
+            <a:r>
+              <a:rPr lang="en-US" dirty="0" smtClean="0"/>
+              <a:t>)</a:t>
+            </a:r>
+            <a:endParaRPr lang="en-US" dirty="0" smtClean="0"/>
           </a:p>
         </p:txBody>
       </p:sp>
@@ -5115,7 +6138,7 @@
           <a:p>
             <a:fld id="{1C1CB5B1-7AB8-4189-884D-6F6B0BA55CB4}" type="slidenum">
               <a:rPr lang="en-US" smtClean="0"/>
-              <a:t>12</a:t>
+              <a:t>15</a:t>
             </a:fld>
             <a:endParaRPr lang="en-US"/>
           </a:p>
@@ -5247,33 +6270,6 @@
                                   </p:childTnLst>
                                 </p:cTn>
                               </p:par>
-                              <p:par>
-                                <p:cTn id="11" presetID="1" presetClass="entr" presetSubtype="0" fill="hold" grpId="0" nodeType="withEffect">
-                                  <p:stCondLst>
-                                    <p:cond delay="0"/>
-                                  </p:stCondLst>
-                                  <p:childTnLst>
-                                    <p:set>
-                                      <p:cBhvr>
-                                        <p:cTn id="12" dur="1" fill="hold">
-                                          <p:stCondLst>
-                                            <p:cond delay="0"/>
-                                          </p:stCondLst>
-                                        </p:cTn>
-                                        <p:tgtEl>
-                                          <p:spTgt spid="4"/>
-                                        </p:tgtEl>
-                                        <p:attrNameLst>
-                                          <p:attrName>style.visibility</p:attrName>
-                                        </p:attrNameLst>
-                                      </p:cBhvr>
-                                      <p:to>
-                                        <p:strVal val="visible"/>
-                                      </p:to>
-                                    </p:set>
-                                  </p:childTnLst>
-                                </p:cTn>
-                              </p:par>
                             </p:childTnLst>
                           </p:cTn>
                         </p:par>
@@ -5281,26 +6277,26 @@
                     </p:cTn>
                   </p:par>
                   <p:par>
-                    <p:cTn id="13" fill="hold">
+                    <p:cTn id="11" fill="hold">
                       <p:stCondLst>
                         <p:cond delay="indefinite"/>
                       </p:stCondLst>
                       <p:childTnLst>
                         <p:par>
-                          <p:cTn id="14" fill="hold">
+                          <p:cTn id="12" fill="hold">
                             <p:stCondLst>
                               <p:cond delay="0"/>
                             </p:stCondLst>
                             <p:childTnLst>
                               <p:par>
-                                <p:cTn id="15" presetID="1" presetClass="entr" presetSubtype="0" fill="hold" grpId="0" nodeType="clickEffect">
+                                <p:cTn id="13" presetID="1" presetClass="entr" presetSubtype="0" fill="hold" grpId="0" nodeType="clickEffect">
                                   <p:stCondLst>
                                     <p:cond delay="0"/>
                                   </p:stCondLst>
                                   <p:childTnLst>
                                     <p:set>
                                       <p:cBhvr>
-                                        <p:cTn id="16" dur="1" fill="hold">
+                                        <p:cTn id="14" dur="1" fill="hold">
                                           <p:stCondLst>
                                             <p:cond delay="0"/>
                                           </p:stCondLst>
@@ -5323,33 +6319,15 @@
                                   </p:childTnLst>
                                 </p:cTn>
                               </p:par>
-                            </p:childTnLst>
-                          </p:cTn>
-                        </p:par>
-                      </p:childTnLst>
-                    </p:cTn>
-                  </p:par>
-                  <p:par>
-                    <p:cTn id="17" fill="hold">
-                      <p:stCondLst>
-                        <p:cond delay="indefinite"/>
-                      </p:stCondLst>
-                      <p:childTnLst>
-                        <p:par>
-                          <p:cTn id="18" fill="hold">
-                            <p:stCondLst>
-                              <p:cond delay="0"/>
-                            </p:stCondLst>
-                            <p:childTnLst>
                               <p:par>
-                                <p:cTn id="19" presetID="1" presetClass="entr" presetSubtype="0" fill="hold" grpId="0" nodeType="clickEffect">
+                                <p:cTn id="15" presetID="1" presetClass="entr" presetSubtype="0" fill="hold" grpId="0" nodeType="withEffect">
                                   <p:stCondLst>
                                     <p:cond delay="0"/>
                                   </p:stCondLst>
                                   <p:childTnLst>
                                     <p:set>
                                       <p:cBhvr>
-                                        <p:cTn id="20" dur="1" fill="hold">
+                                        <p:cTn id="16" dur="1" fill="hold">
                                           <p:stCondLst>
                                             <p:cond delay="0"/>
                                           </p:stCondLst>
@@ -5372,26 +6350,101 @@
                                   </p:childTnLst>
                                 </p:cTn>
                               </p:par>
-                            </p:childTnLst>
-                          </p:cTn>
-                        </p:par>
-                      </p:childTnLst>
-                    </p:cTn>
-                  </p:par>
-                  <p:par>
-                    <p:cTn id="21" fill="hold">
-                      <p:stCondLst>
-                        <p:cond delay="indefinite"/>
-                      </p:stCondLst>
-                      <p:childTnLst>
-                        <p:par>
-                          <p:cTn id="22" fill="hold">
-                            <p:stCondLst>
-                              <p:cond delay="0"/>
-                            </p:stCondLst>
-                            <p:childTnLst>
                               <p:par>
-                                <p:cTn id="23" presetID="1" presetClass="entr" presetSubtype="0" fill="hold" grpId="0" nodeType="clickEffect">
+                                <p:cTn id="17" presetID="1" presetClass="entr" presetSubtype="0" fill="hold" grpId="0" nodeType="withEffect">
+                                  <p:stCondLst>
+                                    <p:cond delay="0"/>
+                                  </p:stCondLst>
+                                  <p:childTnLst>
+                                    <p:set>
+                                      <p:cBhvr>
+                                        <p:cTn id="18" dur="1" fill="hold">
+                                          <p:stCondLst>
+                                            <p:cond delay="0"/>
+                                          </p:stCondLst>
+                                        </p:cTn>
+                                        <p:tgtEl>
+                                          <p:spTgt spid="3">
+                                            <p:txEl>
+                                              <p:pRg st="5" end="5"/>
+                                            </p:txEl>
+                                          </p:spTgt>
+                                        </p:tgtEl>
+                                        <p:attrNameLst>
+                                          <p:attrName>style.visibility</p:attrName>
+                                        </p:attrNameLst>
+                                      </p:cBhvr>
+                                      <p:to>
+                                        <p:strVal val="visible"/>
+                                      </p:to>
+                                    </p:set>
+                                  </p:childTnLst>
+                                </p:cTn>
+                              </p:par>
+                              <p:par>
+                                <p:cTn id="19" presetID="1" presetClass="entr" presetSubtype="0" fill="hold" grpId="0" nodeType="withEffect">
+                                  <p:stCondLst>
+                                    <p:cond delay="0"/>
+                                  </p:stCondLst>
+                                  <p:childTnLst>
+                                    <p:set>
+                                      <p:cBhvr>
+                                        <p:cTn id="20" dur="1" fill="hold">
+                                          <p:stCondLst>
+                                            <p:cond delay="0"/>
+                                          </p:stCondLst>
+                                        </p:cTn>
+                                        <p:tgtEl>
+                                          <p:spTgt spid="3">
+                                            <p:txEl>
+                                              <p:pRg st="6" end="6"/>
+                                            </p:txEl>
+                                          </p:spTgt>
+                                        </p:tgtEl>
+                                        <p:attrNameLst>
+                                          <p:attrName>style.visibility</p:attrName>
+                                        </p:attrNameLst>
+                                      </p:cBhvr>
+                                      <p:to>
+                                        <p:strVal val="visible"/>
+                                      </p:to>
+                                    </p:set>
+                                  </p:childTnLst>
+                                </p:cTn>
+                              </p:par>
+                              <p:par>
+                                <p:cTn id="21" presetID="1" presetClass="entr" presetSubtype="0" fill="hold" grpId="0" nodeType="withEffect">
+                                  <p:stCondLst>
+                                    <p:cond delay="0"/>
+                                  </p:stCondLst>
+                                  <p:childTnLst>
+                                    <p:set>
+                                      <p:cBhvr>
+                                        <p:cTn id="22" dur="1" fill="hold">
+                                          <p:stCondLst>
+                                            <p:cond delay="0"/>
+                                          </p:stCondLst>
+                                        </p:cTn>
+                                        <p:tgtEl>
+                                          <p:spTgt spid="3">
+                                            <p:txEl>
+                                              <p:pRg st="7" end="7"/>
+                                            </p:txEl>
+                                          </p:spTgt>
+                                        </p:tgtEl>
+                                        <p:attrNameLst>
+                                          <p:attrName>style.visibility</p:attrName>
+                                        </p:attrNameLst>
+                                      </p:cBhvr>
+                                      <p:to>
+                                        <p:strVal val="visible"/>
+                                      </p:to>
+                                    </p:set>
+                                  </p:childTnLst>
+                                </p:cTn>
+                              </p:par>
+                              <p:par>
+                                <p:cTn id="23" presetID="1" presetClass="entr" presetSubtype="0" fill="hold" grpId="0" nodeType="withEffect">
                                   <p:stCondLst>
                                     <p:cond delay="0"/>
                                   </p:stCondLst>
@@ -5406,7 +6459,69 @@
                                         <p:tgtEl>
                                           <p:spTgt spid="3">
                                             <p:txEl>
-                                              <p:pRg st="5" end="5"/>
+                                              <p:pRg st="8" end="8"/>
+                                            </p:txEl>
+                                          </p:spTgt>
+                                        </p:tgtEl>
+                                        <p:attrNameLst>
+                                          <p:attrName>style.visibility</p:attrName>
+                                        </p:attrNameLst>
+                                      </p:cBhvr>
+                                      <p:to>
+                                        <p:strVal val="visible"/>
+                                      </p:to>
+                                    </p:set>
+                                  </p:childTnLst>
+                                </p:cTn>
+                              </p:par>
+                              <p:par>
+                                <p:cTn id="25" presetID="1" presetClass="entr" presetSubtype="0" fill="hold" grpId="0" nodeType="withEffect">
+                                  <p:stCondLst>
+                                    <p:cond delay="0"/>
+                                  </p:stCondLst>
+                                  <p:childTnLst>
+                                    <p:set>
+                                      <p:cBhvr>
+                                        <p:cTn id="26" dur="1" fill="hold">
+                                          <p:stCondLst>
+                                            <p:cond delay="0"/>
+                                          </p:stCondLst>
+                                        </p:cTn>
+                                        <p:tgtEl>
+                                          <p:spTgt spid="3">
+                                            <p:txEl>
+                                              <p:pRg st="9" end="9"/>
+                                            </p:txEl>
+                                          </p:spTgt>
+                                        </p:tgtEl>
+                                        <p:attrNameLst>
+                                          <p:attrName>style.visibility</p:attrName>
+                                        </p:attrNameLst>
+                                      </p:cBhvr>
+                                      <p:to>
+                                        <p:strVal val="visible"/>
+                                      </p:to>
+                                    </p:set>
+                                  </p:childTnLst>
+                                </p:cTn>
+                              </p:par>
+                              <p:par>
+                                <p:cTn id="27" presetID="1" presetClass="entr" presetSubtype="0" fill="hold" grpId="0" nodeType="withEffect">
+                                  <p:stCondLst>
+                                    <p:cond delay="0"/>
+                                  </p:stCondLst>
+                                  <p:childTnLst>
+                                    <p:set>
+                                      <p:cBhvr>
+                                        <p:cTn id="28" dur="1" fill="hold">
+                                          <p:stCondLst>
+                                            <p:cond delay="0"/>
+                                          </p:stCondLst>
+                                        </p:cTn>
+                                        <p:tgtEl>
+                                          <p:spTgt spid="3">
+                                            <p:txEl>
+                                              <p:pRg st="10" end="10"/>
                                             </p:txEl>
                                           </p:spTgt>
                                         </p:tgtEl>
@@ -5450,198 +6565,7 @@
     </p:tnLst>
     <p:bldLst>
       <p:bldP spid="3" grpId="0" build="p"/>
-      <p:bldP spid="4" grpId="0" animBg="1"/>
     </p:bldLst>
-  </p:timing>
-</p:sld>
-</file>
-
-<file path=ppt/slides/slide13.xml><?xml version="1.0" encoding="utf-8"?>
-<p:sld xmlns:a="http://schemas.openxmlformats.org/drawingml/2006/main" xmlns:r="http://schemas.openxmlformats.org/officeDocument/2006/relationships" xmlns:p="http://schemas.openxmlformats.org/presentationml/2006/main">
-  <p:cSld>
-    <p:spTree>
-      <p:nvGrpSpPr>
-        <p:cNvPr id="1" name=""/>
-        <p:cNvGrpSpPr/>
-        <p:nvPr/>
-      </p:nvGrpSpPr>
-      <p:grpSpPr>
-        <a:xfrm>
-          <a:off x="0" y="0"/>
-          <a:ext cx="0" cy="0"/>
-          <a:chOff x="0" y="0"/>
-          <a:chExt cx="0" cy="0"/>
-        </a:xfrm>
-      </p:grpSpPr>
-      <p:sp>
-        <p:nvSpPr>
-          <p:cNvPr id="2" name="Title 1"/>
-          <p:cNvSpPr>
-            <a:spLocks noGrp="1"/>
-          </p:cNvSpPr>
-          <p:nvPr>
-            <p:ph type="title"/>
-          </p:nvPr>
-        </p:nvSpPr>
-        <p:spPr/>
-        <p:txBody>
-          <a:bodyPr/>
-          <a:lstStyle/>
-          <a:p>
-            <a:r>
-              <a:rPr lang="en-US" dirty="0" smtClean="0"/>
-              <a:t>References</a:t>
-            </a:r>
-            <a:endParaRPr lang="en-US" dirty="0"/>
-          </a:p>
-        </p:txBody>
-      </p:sp>
-      <p:sp>
-        <p:nvSpPr>
-          <p:cNvPr id="3" name="Content Placeholder 2"/>
-          <p:cNvSpPr>
-            <a:spLocks noGrp="1"/>
-          </p:cNvSpPr>
-          <p:nvPr>
-            <p:ph idx="1"/>
-          </p:nvPr>
-        </p:nvSpPr>
-        <p:spPr/>
-        <p:txBody>
-          <a:bodyPr/>
-          <a:lstStyle/>
-          <a:p>
-            <a:r>
-              <a:rPr lang="en-US" dirty="0" smtClean="0"/>
-              <a:t>PEP8 style guide</a:t>
-            </a:r>
-            <a:br>
-              <a:rPr lang="en-US" dirty="0" smtClean="0"/>
-            </a:br>
-            <a:r>
-              <a:rPr lang="en-US" sz="2400" dirty="0" smtClean="0">
-                <a:hlinkClick r:id="rId2"/>
-              </a:rPr>
-              <a:t>https</a:t>
-            </a:r>
-            <a:r>
-              <a:rPr lang="en-US" sz="2400" dirty="0">
-                <a:hlinkClick r:id="rId2"/>
-              </a:rPr>
-              <a:t>://www.python.org/dev/peps/pep-0008</a:t>
-            </a:r>
-            <a:r>
-              <a:rPr lang="en-US" sz="2400" dirty="0" smtClean="0">
-                <a:hlinkClick r:id="rId2"/>
-              </a:rPr>
-              <a:t>/</a:t>
-            </a:r>
-            <a:r>
-              <a:rPr lang="en-US" sz="2400" dirty="0" smtClean="0"/>
-              <a:t> </a:t>
-            </a:r>
-          </a:p>
-          <a:p>
-            <a:r>
-              <a:rPr lang="en-US" i="1" dirty="0"/>
-              <a:t>Writing idiomatic Python 3.3</a:t>
-            </a:r>
-            <a:br>
-              <a:rPr lang="en-US" i="1" dirty="0"/>
-            </a:br>
-            <a:r>
-              <a:rPr lang="en-US" dirty="0"/>
-              <a:t>Jeff </a:t>
-            </a:r>
-            <a:r>
-              <a:rPr lang="en-US" dirty="0" err="1"/>
-              <a:t>Knupp</a:t>
-            </a:r>
-            <a:r>
-              <a:rPr lang="en-US" dirty="0"/>
-              <a:t>, </a:t>
-            </a:r>
-            <a:r>
-              <a:rPr lang="en-US" dirty="0" smtClean="0"/>
-              <a:t>2013</a:t>
-            </a:r>
-          </a:p>
-          <a:p>
-            <a:r>
-              <a:rPr lang="en-US" dirty="0" smtClean="0"/>
-              <a:t>GitHub</a:t>
-            </a:r>
-            <a:br>
-              <a:rPr lang="en-US" dirty="0" smtClean="0"/>
-            </a:br>
-            <a:r>
-              <a:rPr lang="en-US" sz="2400" dirty="0" smtClean="0">
-                <a:hlinkClick r:id="rId3"/>
-              </a:rPr>
-              <a:t>https</a:t>
-            </a:r>
-            <a:r>
-              <a:rPr lang="en-US" sz="2400" dirty="0">
-                <a:hlinkClick r:id="rId3"/>
-              </a:rPr>
-              <a:t>://github.com</a:t>
-            </a:r>
-            <a:r>
-              <a:rPr lang="en-US" sz="2400" dirty="0" smtClean="0">
-                <a:hlinkClick r:id="rId3"/>
-              </a:rPr>
-              <a:t>/</a:t>
-            </a:r>
-            <a:r>
-              <a:rPr lang="en-US" dirty="0" smtClean="0"/>
-              <a:t> </a:t>
-            </a:r>
-            <a:endParaRPr lang="en-US" dirty="0"/>
-          </a:p>
-          <a:p>
-            <a:endParaRPr lang="en-US" dirty="0"/>
-          </a:p>
-        </p:txBody>
-      </p:sp>
-      <p:sp>
-        <p:nvSpPr>
-          <p:cNvPr id="4" name="Slide Number Placeholder 3"/>
-          <p:cNvSpPr>
-            <a:spLocks noGrp="1"/>
-          </p:cNvSpPr>
-          <p:nvPr>
-            <p:ph type="sldNum" sz="quarter" idx="12"/>
-          </p:nvPr>
-        </p:nvSpPr>
-        <p:spPr/>
-        <p:txBody>
-          <a:bodyPr/>
-          <a:lstStyle/>
-          <a:p>
-            <a:fld id="{1C1CB5B1-7AB8-4189-884D-6F6B0BA55CB4}" type="slidenum">
-              <a:rPr lang="en-US" smtClean="0"/>
-              <a:t>13</a:t>
-            </a:fld>
-            <a:endParaRPr lang="en-US"/>
-          </a:p>
-        </p:txBody>
-      </p:sp>
-    </p:spTree>
-    <p:extLst>
-      <p:ext uri="{BB962C8B-B14F-4D97-AF65-F5344CB8AC3E}">
-        <p14:creationId xmlns:p14="http://schemas.microsoft.com/office/powerpoint/2010/main" val="1549972676"/>
-      </p:ext>
-    </p:extLst>
-  </p:cSld>
-  <p:clrMapOvr>
-    <a:masterClrMapping/>
-  </p:clrMapOvr>
-  <p:timing>
-    <p:tnLst>
-      <p:par>
-        <p:cTn id="1" dur="indefinite" restart="never" nodeType="tmRoot"/>
-      </p:par>
-    </p:tnLst>
   </p:timing>
 </p:sld>
 </file>
@@ -5783,6 +6707,13 @@
   <p:clrMapOvr>
     <a:masterClrMapping/>
   </p:clrMapOvr>
+  <p:timing>
+    <p:tnLst>
+      <p:par>
+        <p:cTn id="1" dur="indefinite" restart="never" nodeType="tmRoot"/>
+      </p:par>
+    </p:tnLst>
+  </p:timing>
 </p:sld>
 </file>
 
@@ -5821,11 +6752,7 @@
             <a:pPr eaLnBrk="1" hangingPunct="1"/>
             <a:r>
               <a:rPr lang="en-US" altLang="nl-BE" dirty="0" smtClean="0"/>
-              <a:t>Step back: what </a:t>
-            </a:r>
-            <a:r>
-              <a:rPr lang="en-US" altLang="nl-BE" dirty="0" smtClean="0"/>
-              <a:t>is programming?</a:t>
+              <a:t>Step back: what is programming?</a:t>
             </a:r>
           </a:p>
         </p:txBody>
@@ -7091,7 +8018,7 @@
             <a:graphicData uri="http://schemas.openxmlformats.org/presentationml/2006/ole">
               <mc:AlternateContent xmlns:mc="http://schemas.openxmlformats.org/markup-compatibility/2006">
                 <mc:Choice xmlns:v="urn:schemas-microsoft-com:vml" Requires="v">
-                  <p:oleObj spid="_x0000_s1029" name="Equation" r:id="rId4" imgW="1320227" imgH="710891" progId="Equation.3">
+                  <p:oleObj spid="_x0000_s1035" name="Equation" r:id="rId4" imgW="1320227" imgH="710891" progId="Equation.3">
                     <p:embed/>
                   </p:oleObj>
                 </mc:Choice>
@@ -7603,13 +8530,7 @@
                 <a:rPr lang="en-US" altLang="nl-BE" sz="1800" dirty="0" smtClean="0">
                   <a:latin typeface="Times New Roman" pitchFamily="18" charset="0"/>
                 </a:rPr>
-                <a:t>(object</a:t>
-              </a:r>
-              <a:r>
-                <a:rPr lang="en-US" altLang="nl-BE" sz="1800" dirty="0" smtClean="0">
-                  <a:latin typeface="Times New Roman" pitchFamily="18" charset="0"/>
-                </a:rPr>
-                <a:t>):</a:t>
+                <a:t>(object):</a:t>
               </a:r>
               <a:endParaRPr lang="en-US" altLang="nl-BE" sz="1800" dirty="0">
                 <a:latin typeface="Times New Roman" pitchFamily="18" charset="0"/>
@@ -8341,23 +9262,14 @@
           <a:p>
             <a:r>
               <a:rPr lang="en-US" dirty="0" smtClean="0"/>
-              <a:t>Respect coding </a:t>
-            </a:r>
+              <a:t>Respect coding style standards</a:t>
+            </a:r>
+          </a:p>
+          <a:p>
             <a:r>
               <a:rPr lang="en-US" dirty="0" smtClean="0"/>
-              <a:t>style standards</a:t>
-            </a:r>
-          </a:p>
-          <a:p>
-            <a:r>
-              <a:rPr lang="en-US" dirty="0" smtClean="0"/>
-              <a:t>Use language </a:t>
-            </a:r>
-            <a:r>
-              <a:rPr lang="en-US" dirty="0" smtClean="0"/>
-              <a:t>idioms</a:t>
-            </a:r>
-            <a:endParaRPr lang="en-US" dirty="0" smtClean="0"/>
+              <a:t>Use language idioms</a:t>
+            </a:r>
           </a:p>
           <a:p>
             <a:r>
@@ -9710,11 +10622,7 @@
             <a:pPr lvl="1"/>
             <a:r>
               <a:rPr lang="en-US" dirty="0" smtClean="0"/>
-              <a:t>number </a:t>
-            </a:r>
-            <a:r>
-              <a:rPr lang="en-US" dirty="0" smtClean="0"/>
-              <a:t>of bugs </a:t>
+              <a:t>number of bugs </a:t>
             </a:r>
             <a:r>
               <a:rPr lang="en-US" dirty="0" smtClean="0">
@@ -9742,11 +10650,7 @@
             <a:pPr lvl="1"/>
             <a:r>
               <a:rPr lang="en-US" dirty="0" smtClean="0"/>
-              <a:t>enrich </a:t>
-            </a:r>
-            <a:r>
-              <a:rPr lang="en-US" dirty="0" smtClean="0"/>
-              <a:t>vocabulary</a:t>
+              <a:t>enrich vocabulary</a:t>
             </a:r>
           </a:p>
           <a:p>
@@ -9759,13 +10663,8 @@
           <a:p>
             <a:r>
               <a:rPr lang="en-US" dirty="0" smtClean="0"/>
-              <a:t>Top-down versus </a:t>
-            </a:r>
-            <a:r>
-              <a:rPr lang="en-US" dirty="0" smtClean="0"/>
-              <a:t>bottom-up development</a:t>
-            </a:r>
-            <a:endParaRPr lang="en-US" dirty="0" smtClean="0"/>
+              <a:t>Top-down versus bottom-up development</a:t>
+            </a:r>
           </a:p>
           <a:p>
             <a:pPr lvl="1"/>
@@ -10415,7 +11314,6 @@
               <a:rPr lang="en-US" dirty="0" smtClean="0"/>
               <a:t> </a:t>
             </a:r>
-            <a:endParaRPr lang="en-US" dirty="0" smtClean="0"/>
           </a:p>
           <a:p>
             <a:r>
@@ -11372,11 +12270,7 @@
             <a:pPr lvl="1"/>
             <a:r>
               <a:rPr lang="en-US" dirty="0" smtClean="0"/>
-              <a:t>when, e.g., </a:t>
-            </a:r>
-            <a:r>
-              <a:rPr lang="en-US" dirty="0" smtClean="0"/>
-              <a:t>writing Python, don't write C</a:t>
+              <a:t>when, e.g., writing Python, don't write C</a:t>
             </a:r>
           </a:p>
           <a:p>
@@ -11384,7 +12278,6 @@
               <a:rPr lang="en-US" dirty="0" smtClean="0"/>
               <a:t>Example</a:t>
             </a:r>
-            <a:endParaRPr lang="en-US" dirty="0" smtClean="0"/>
           </a:p>
           <a:p>
             <a:pPr lvl="1"/>

</xml_diff>